<commit_message>
docs: Include updated sprint 2 pitch presentation
</commit_message>
<xml_diff>
--- a/docs/resources/Spirnt2-Presentation.pptx
+++ b/docs/resources/Spirnt2-Presentation.pptx
@@ -9,11 +9,12 @@
     <p:sldId id="263" r:id="rId3"/>
     <p:sldId id="262" r:id="rId4"/>
     <p:sldId id="261" r:id="rId5"/>
-    <p:sldId id="260" r:id="rId6"/>
-    <p:sldId id="259" r:id="rId7"/>
-    <p:sldId id="258" r:id="rId8"/>
-    <p:sldId id="257" r:id="rId9"/>
-    <p:sldId id="256" r:id="rId10"/>
+    <p:sldId id="264" r:id="rId6"/>
+    <p:sldId id="260" r:id="rId7"/>
+    <p:sldId id="259" r:id="rId8"/>
+    <p:sldId id="258" r:id="rId9"/>
+    <p:sldId id="257" r:id="rId10"/>
+    <p:sldId id="256" r:id="rId11"/>
   </p:sldIdLst>
   <p:sldSz cx="12192000" cy="6858000"/>
   <p:notesSz cx="6858000" cy="9144000"/>
@@ -124,7 +125,9 @@
 <p1510:revInfo xmlns:a="http://schemas.openxmlformats.org/drawingml/2006/main" xmlns:r="http://schemas.openxmlformats.org/officeDocument/2006/relationships" xmlns:p1510="http://schemas.microsoft.com/office/powerpoint/2015/10/main">
   <p1510:revLst>
     <p1510:client id="{57277811-192A-DC78-E1DB-38450E04E578}" v="1" dt="2022-03-20T14:04:44.203"/>
+    <p1510:client id="{8F2D708A-0D1D-80A6-64B4-7BAE71B2BD30}" v="2" dt="2022-03-22T09:56:17.955"/>
     <p1510:client id="{9ADD545E-4566-42B4-A36D-F4DBE08A2A06}" v="56" dt="2022-03-20T12:46:22.820"/>
+    <p1510:client id="{B3AA8B0F-2B84-49D5-E223-B071C7D9EBC6}" v="66" dt="2022-03-22T09:14:30.627"/>
     <p1510:client id="{DD026B5A-41F0-BA5E-10C5-BA48C74E3A80}" v="10" dt="2022-03-20T14:05:42.825"/>
   </p1510:revLst>
 </p1510:revInfo>
@@ -1300,6 +1303,62 @@
     </pc:docChg>
   </pc:docChgLst>
   <pc:docChgLst>
+    <pc:chgData name="Vincenzo Savarese" userId="S::498899@student.saxion.nl::b317b989-15a1-40d6-8b23-c78481812a62" providerId="AD" clId="Web-{B3AA8B0F-2B84-49D5-E223-B071C7D9EBC6}"/>
+    <pc:docChg chg="addSld modSld">
+      <pc:chgData name="Vincenzo Savarese" userId="S::498899@student.saxion.nl::b317b989-15a1-40d6-8b23-c78481812a62" providerId="AD" clId="Web-{B3AA8B0F-2B84-49D5-E223-B071C7D9EBC6}" dt="2022-03-22T09:14:28.002" v="61" actId="20577"/>
+      <pc:docMkLst>
+        <pc:docMk/>
+      </pc:docMkLst>
+      <pc:sldChg chg="modSp new">
+        <pc:chgData name="Vincenzo Savarese" userId="S::498899@student.saxion.nl::b317b989-15a1-40d6-8b23-c78481812a62" providerId="AD" clId="Web-{B3AA8B0F-2B84-49D5-E223-B071C7D9EBC6}" dt="2022-03-22T09:14:28.002" v="61" actId="20577"/>
+        <pc:sldMkLst>
+          <pc:docMk/>
+          <pc:sldMk cId="2947484381" sldId="264"/>
+        </pc:sldMkLst>
+        <pc:spChg chg="mod">
+          <ac:chgData name="Vincenzo Savarese" userId="S::498899@student.saxion.nl::b317b989-15a1-40d6-8b23-c78481812a62" providerId="AD" clId="Web-{B3AA8B0F-2B84-49D5-E223-B071C7D9EBC6}" dt="2022-03-22T09:14:24.189" v="60" actId="20577"/>
+          <ac:spMkLst>
+            <pc:docMk/>
+            <pc:sldMk cId="2947484381" sldId="264"/>
+            <ac:spMk id="2" creationId="{7F96819A-D5A9-B1D6-571B-9C2DD1C8B6A3}"/>
+          </ac:spMkLst>
+        </pc:spChg>
+        <pc:spChg chg="mod">
+          <ac:chgData name="Vincenzo Savarese" userId="S::498899@student.saxion.nl::b317b989-15a1-40d6-8b23-c78481812a62" providerId="AD" clId="Web-{B3AA8B0F-2B84-49D5-E223-B071C7D9EBC6}" dt="2022-03-22T09:14:28.002" v="61" actId="20577"/>
+          <ac:spMkLst>
+            <pc:docMk/>
+            <pc:sldMk cId="2947484381" sldId="264"/>
+            <ac:spMk id="3" creationId="{867C4F89-223D-849E-89AD-8BB4C18B61A3}"/>
+          </ac:spMkLst>
+        </pc:spChg>
+      </pc:sldChg>
+    </pc:docChg>
+  </pc:docChgLst>
+  <pc:docChgLst>
+    <pc:chgData name="Peter Pintér" userId="S::490498@student.saxion.nl::991a9729-1dd3-4cc4-a65e-786c7df47fbf" providerId="AD" clId="Web-{8F2D708A-0D1D-80A6-64B4-7BAE71B2BD30}"/>
+    <pc:docChg chg="modSld">
+      <pc:chgData name="Peter Pintér" userId="S::490498@student.saxion.nl::991a9729-1dd3-4cc4-a65e-786c7df47fbf" providerId="AD" clId="Web-{8F2D708A-0D1D-80A6-64B4-7BAE71B2BD30}" dt="2022-03-22T09:56:14.908" v="0" actId="20577"/>
+      <pc:docMkLst>
+        <pc:docMk/>
+      </pc:docMkLst>
+      <pc:sldChg chg="modSp">
+        <pc:chgData name="Peter Pintér" userId="S::490498@student.saxion.nl::991a9729-1dd3-4cc4-a65e-786c7df47fbf" providerId="AD" clId="Web-{8F2D708A-0D1D-80A6-64B4-7BAE71B2BD30}" dt="2022-03-22T09:56:14.908" v="0" actId="20577"/>
+        <pc:sldMkLst>
+          <pc:docMk/>
+          <pc:sldMk cId="2947484381" sldId="264"/>
+        </pc:sldMkLst>
+        <pc:spChg chg="mod">
+          <ac:chgData name="Peter Pintér" userId="S::490498@student.saxion.nl::991a9729-1dd3-4cc4-a65e-786c7df47fbf" providerId="AD" clId="Web-{8F2D708A-0D1D-80A6-64B4-7BAE71B2BD30}" dt="2022-03-22T09:56:14.908" v="0" actId="20577"/>
+          <ac:spMkLst>
+            <pc:docMk/>
+            <pc:sldMk cId="2947484381" sldId="264"/>
+            <ac:spMk id="3" creationId="{867C4F89-223D-849E-89AD-8BB4C18B61A3}"/>
+          </ac:spMkLst>
+        </pc:spChg>
+      </pc:sldChg>
+    </pc:docChg>
+  </pc:docChgLst>
+  <pc:docChgLst>
     <pc:chgData name="Mira Ilieva" userId="S::497124@student.saxion.nl::1fa64334-c67a-4dda-8330-986d204488ba" providerId="AD" clId="Web-{57277811-192A-DC78-E1DB-38450E04E578}"/>
     <pc:docChg chg="modSld">
       <pc:chgData name="Mira Ilieva" userId="S::497124@student.saxion.nl::1fa64334-c67a-4dda-8330-986d204488ba" providerId="AD" clId="Web-{57277811-192A-DC78-E1DB-38450E04E578}" dt="2022-03-20T14:04:44.203" v="0"/>
@@ -1563,7 +1622,6 @@
               <a:rPr lang="en-US"/>
               <a:t>Click to edit Master title style</a:t>
             </a:r>
-            <a:endParaRPr lang="en-US" dirty="0"/>
           </a:p>
         </p:txBody>
       </p:sp>
@@ -1634,7 +1692,6 @@
               <a:rPr lang="en-US"/>
               <a:t>Click to edit Master subtitle style</a:t>
             </a:r>
-            <a:endParaRPr lang="en-US" dirty="0"/>
           </a:p>
         </p:txBody>
       </p:sp>
@@ -2075,9 +2132,9 @@
           <a:p>
             <a:fld id="{97BFF81C-1FCB-4DBA-8044-F1A0FCFD45A6}" type="datetime1">
               <a:rPr lang="en-US" smtClean="0"/>
-              <a:t>3/20/2022</a:t>
+              <a:t>3/22/2022</a:t>
             </a:fld>
-            <a:endParaRPr lang="en-US" dirty="0"/>
+            <a:endParaRPr lang="en-US"/>
           </a:p>
         </p:txBody>
       </p:sp>
@@ -2103,7 +2160,7 @@
           <a:lstStyle/>
           <a:p>
             <a:r>
-              <a:rPr lang="en-US" dirty="0"/>
+              <a:rPr lang="en-US"/>
               <a:t>Sample Footer Text</a:t>
             </a:r>
           </a:p>
@@ -2132,9 +2189,9 @@
           <a:p>
             <a:fld id="{F3450C42-9A0B-4425-92C2-70FCF7C45734}" type="slidenum">
               <a:rPr lang="en-US" smtClean="0"/>
-              <a:t>‹Nr.›</a:t>
+              <a:t>‹#›</a:t>
             </a:fld>
-            <a:endParaRPr lang="en-US" dirty="0"/>
+            <a:endParaRPr lang="en-US"/>
           </a:p>
         </p:txBody>
       </p:sp>
@@ -2255,7 +2312,6 @@
               <a:rPr lang="en-US"/>
               <a:t>Click to edit Master title style</a:t>
             </a:r>
-            <a:endParaRPr lang="en-US" dirty="0"/>
           </a:p>
         </p:txBody>
       </p:sp>
@@ -2313,7 +2369,6 @@
               <a:rPr lang="en-US"/>
               <a:t>Fifth level</a:t>
             </a:r>
-            <a:endParaRPr lang="en-US" dirty="0"/>
           </a:p>
         </p:txBody>
       </p:sp>
@@ -2754,9 +2809,9 @@
           <a:p>
             <a:fld id="{FB9092B3-2D87-4CDF-B84B-C46E5F5D31F7}" type="datetime1">
               <a:rPr lang="en-US" smtClean="0"/>
-              <a:t>3/20/2022</a:t>
+              <a:t>3/22/2022</a:t>
             </a:fld>
-            <a:endParaRPr lang="en-US" dirty="0"/>
+            <a:endParaRPr lang="en-US"/>
           </a:p>
         </p:txBody>
       </p:sp>
@@ -2782,7 +2837,7 @@
           <a:lstStyle/>
           <a:p>
             <a:r>
-              <a:rPr lang="en-US" dirty="0"/>
+              <a:rPr lang="en-US"/>
               <a:t>Sample Footer Text</a:t>
             </a:r>
           </a:p>
@@ -2811,9 +2866,9 @@
           <a:p>
             <a:fld id="{F3450C42-9A0B-4425-92C2-70FCF7C45734}" type="slidenum">
               <a:rPr lang="en-US" smtClean="0"/>
-              <a:t>‹Nr.›</a:t>
+              <a:t>‹#›</a:t>
             </a:fld>
-            <a:endParaRPr lang="en-US" dirty="0"/>
+            <a:endParaRPr lang="en-US"/>
           </a:p>
         </p:txBody>
       </p:sp>
@@ -2939,7 +2994,6 @@
               <a:rPr lang="en-US"/>
               <a:t>Click to edit Master title style</a:t>
             </a:r>
-            <a:endParaRPr lang="en-US" dirty="0"/>
           </a:p>
         </p:txBody>
       </p:sp>
@@ -3002,7 +3056,6 @@
               <a:rPr lang="en-US"/>
               <a:t>Fifth level</a:t>
             </a:r>
-            <a:endParaRPr lang="en-US" dirty="0"/>
           </a:p>
         </p:txBody>
       </p:sp>
@@ -3443,9 +3496,9 @@
           <a:p>
             <a:fld id="{3D769E57-47B1-47B0-B526-3153E4B1E729}" type="datetime1">
               <a:rPr lang="en-US" smtClean="0"/>
-              <a:t>3/20/2022</a:t>
+              <a:t>3/22/2022</a:t>
             </a:fld>
-            <a:endParaRPr lang="en-US" dirty="0"/>
+            <a:endParaRPr lang="en-US"/>
           </a:p>
         </p:txBody>
       </p:sp>
@@ -3471,7 +3524,7 @@
           <a:lstStyle/>
           <a:p>
             <a:r>
-              <a:rPr lang="en-US" dirty="0"/>
+              <a:rPr lang="en-US"/>
               <a:t>Sample Footer Text</a:t>
             </a:r>
           </a:p>
@@ -3500,9 +3553,9 @@
           <a:p>
             <a:fld id="{F3450C42-9A0B-4425-92C2-70FCF7C45734}" type="slidenum">
               <a:rPr lang="en-US" smtClean="0"/>
-              <a:t>‹Nr.›</a:t>
+              <a:t>‹#›</a:t>
             </a:fld>
-            <a:endParaRPr lang="en-US" dirty="0"/>
+            <a:endParaRPr lang="en-US"/>
           </a:p>
         </p:txBody>
       </p:sp>
@@ -3634,7 +3687,6 @@
               <a:rPr lang="en-US"/>
               <a:t>Click to edit Master title style</a:t>
             </a:r>
-            <a:endParaRPr lang="en-US" dirty="0"/>
           </a:p>
         </p:txBody>
       </p:sp>
@@ -3705,7 +3757,6 @@
               <a:rPr lang="en-US"/>
               <a:t>Click to edit Master subtitle style</a:t>
             </a:r>
-            <a:endParaRPr lang="en-US" dirty="0"/>
           </a:p>
         </p:txBody>
       </p:sp>
@@ -3732,9 +3783,9 @@
           <a:p>
             <a:fld id="{23FEA57E-7C1A-457B-A4CD-5DCEB057B502}" type="datetime1">
               <a:rPr lang="en-US" smtClean="0"/>
-              <a:t>3/20/2022</a:t>
+              <a:t>3/22/2022</a:t>
             </a:fld>
-            <a:endParaRPr lang="en-US" dirty="0"/>
+            <a:endParaRPr lang="en-US"/>
           </a:p>
         </p:txBody>
       </p:sp>
@@ -3760,7 +3811,7 @@
           <a:lstStyle/>
           <a:p>
             <a:r>
-              <a:rPr lang="en-US" dirty="0"/>
+              <a:rPr lang="en-US"/>
               <a:t>Sample Footer Text</a:t>
             </a:r>
           </a:p>
@@ -3789,9 +3840,9 @@
           <a:p>
             <a:fld id="{F8E28480-1C08-4458-AD97-0283E6FFD09D}" type="slidenum">
               <a:rPr lang="en-US" smtClean="0"/>
-              <a:t>‹Nr.›</a:t>
+              <a:t>‹#›</a:t>
             </a:fld>
-            <a:endParaRPr lang="en-US" dirty="0"/>
+            <a:endParaRPr lang="en-US"/>
           </a:p>
         </p:txBody>
       </p:sp>
@@ -3861,7 +3912,6 @@
               <a:rPr lang="en-US"/>
               <a:t>Click to edit Master title style</a:t>
             </a:r>
-            <a:endParaRPr lang="en-US" dirty="0"/>
           </a:p>
         </p:txBody>
       </p:sp>
@@ -3919,7 +3969,6 @@
               <a:rPr lang="en-US"/>
               <a:t>Fifth level</a:t>
             </a:r>
-            <a:endParaRPr lang="en-US" dirty="0"/>
           </a:p>
         </p:txBody>
       </p:sp>
@@ -3946,7 +3995,7 @@
           <a:p>
             <a:fld id="{201AF2CE-4F37-411C-A3EE-BBBE223265BF}" type="datetime1">
               <a:rPr lang="en-US" smtClean="0"/>
-              <a:t>3/20/2022</a:t>
+              <a:t>3/22/2022</a:t>
             </a:fld>
             <a:endParaRPr lang="en-US"/>
           </a:p>
@@ -4003,7 +4052,7 @@
           <a:p>
             <a:fld id="{F8E28480-1C08-4458-AD97-0283E6FFD09D}" type="slidenum">
               <a:rPr lang="en-US" smtClean="0"/>
-              <a:t>‹Nr.›</a:t>
+              <a:t>‹#›</a:t>
             </a:fld>
             <a:endParaRPr lang="en-US"/>
           </a:p>
@@ -4075,7 +4124,6 @@
               <a:rPr lang="en-US"/>
               <a:t>Click to edit Master title style</a:t>
             </a:r>
-            <a:endParaRPr lang="en-US" dirty="0"/>
           </a:p>
         </p:txBody>
       </p:sp>
@@ -4227,7 +4275,7 @@
           <a:p>
             <a:fld id="{C96083D4-708C-4BB5-B4FD-30CE9FA12FD5}" type="datetime1">
               <a:rPr lang="en-US" smtClean="0"/>
-              <a:t>3/20/2022</a:t>
+              <a:t>3/22/2022</a:t>
             </a:fld>
             <a:endParaRPr lang="en-US"/>
           </a:p>
@@ -4255,7 +4303,7 @@
           <a:lstStyle/>
           <a:p>
             <a:r>
-              <a:rPr lang="en-US" dirty="0"/>
+              <a:rPr lang="en-US"/>
               <a:t>Sample Footer Text</a:t>
             </a:r>
           </a:p>
@@ -4284,7 +4332,7 @@
           <a:p>
             <a:fld id="{F8E28480-1C08-4458-AD97-0283E6FFD09D}" type="slidenum">
               <a:rPr lang="en-US" smtClean="0"/>
-              <a:t>‹Nr.›</a:t>
+              <a:t>‹#›</a:t>
             </a:fld>
             <a:endParaRPr lang="en-US"/>
           </a:p>
@@ -4354,7 +4402,6 @@
               <a:rPr lang="en-US"/>
               <a:t>Click to edit Master title style</a:t>
             </a:r>
-            <a:endParaRPr lang="en-US" dirty="0"/>
           </a:p>
         </p:txBody>
       </p:sp>
@@ -4417,7 +4464,6 @@
               <a:rPr lang="en-US"/>
               <a:t>Fifth level</a:t>
             </a:r>
-            <a:endParaRPr lang="en-US" dirty="0"/>
           </a:p>
         </p:txBody>
       </p:sp>
@@ -4480,7 +4526,6 @@
               <a:rPr lang="en-US"/>
               <a:t>Fifth level</a:t>
             </a:r>
-            <a:endParaRPr lang="en-US" dirty="0"/>
           </a:p>
         </p:txBody>
       </p:sp>
@@ -4507,7 +4552,7 @@
           <a:p>
             <a:fld id="{D0D239B2-65BC-4C2A-A62B-3EABFE9590E4}" type="datetime1">
               <a:rPr lang="en-US" smtClean="0"/>
-              <a:t>3/20/2022</a:t>
+              <a:t>3/22/2022</a:t>
             </a:fld>
             <a:endParaRPr lang="en-US"/>
           </a:p>
@@ -4564,7 +4609,7 @@
           <a:p>
             <a:fld id="{F8E28480-1C08-4458-AD97-0283E6FFD09D}" type="slidenum">
               <a:rPr lang="en-US" smtClean="0"/>
-              <a:t>‹Nr.›</a:t>
+              <a:t>‹#›</a:t>
             </a:fld>
             <a:endParaRPr lang="en-US"/>
           </a:p>
@@ -4636,7 +4681,6 @@
               <a:rPr lang="en-US"/>
               <a:t>Click to edit Master title style</a:t>
             </a:r>
-            <a:endParaRPr lang="en-US" dirty="0"/>
           </a:p>
         </p:txBody>
       </p:sp>
@@ -4929,7 +4973,7 @@
           <a:p>
             <a:fld id="{85E05F5A-E4A3-476F-A89E-C2B73F2431E4}" type="datetime1">
               <a:rPr lang="en-US" smtClean="0"/>
-              <a:t>3/20/2022</a:t>
+              <a:t>3/22/2022</a:t>
             </a:fld>
             <a:endParaRPr lang="en-US"/>
           </a:p>
@@ -4986,7 +5030,7 @@
           <a:p>
             <a:fld id="{F8E28480-1C08-4458-AD97-0283E6FFD09D}" type="slidenum">
               <a:rPr lang="en-US" smtClean="0"/>
-              <a:t>‹Nr.›</a:t>
+              <a:t>‹#›</a:t>
             </a:fld>
             <a:endParaRPr lang="en-US"/>
           </a:p>
@@ -5047,7 +5091,6 @@
               <a:rPr lang="en-US"/>
               <a:t>Click to edit Master title style</a:t>
             </a:r>
-            <a:endParaRPr lang="en-US" dirty="0"/>
           </a:p>
         </p:txBody>
       </p:sp>
@@ -5074,7 +5117,7 @@
           <a:p>
             <a:fld id="{E3761515-4A26-4F31-9F61-5A10B1FABBFC}" type="datetime1">
               <a:rPr lang="en-US" smtClean="0"/>
-              <a:t>3/20/2022</a:t>
+              <a:t>3/22/2022</a:t>
             </a:fld>
             <a:endParaRPr lang="en-US"/>
           </a:p>
@@ -5131,7 +5174,7 @@
           <a:p>
             <a:fld id="{F8E28480-1C08-4458-AD97-0283E6FFD09D}" type="slidenum">
               <a:rPr lang="en-US" smtClean="0"/>
-              <a:t>‹Nr.›</a:t>
+              <a:t>‹#›</a:t>
             </a:fld>
             <a:endParaRPr lang="en-US"/>
           </a:p>
@@ -5190,7 +5233,7 @@
           <a:p>
             <a:fld id="{4A75DC65-7D1F-4BAB-9695-F7E734143E14}" type="datetime1">
               <a:rPr lang="en-US" smtClean="0"/>
-              <a:t>3/20/2022</a:t>
+              <a:t>3/22/2022</a:t>
             </a:fld>
             <a:endParaRPr lang="en-US"/>
           </a:p>
@@ -5247,7 +5290,7 @@
           <a:p>
             <a:fld id="{F8E28480-1C08-4458-AD97-0283E6FFD09D}" type="slidenum">
               <a:rPr lang="en-US" smtClean="0"/>
-              <a:t>‹Nr.›</a:t>
+              <a:t>‹#›</a:t>
             </a:fld>
             <a:endParaRPr lang="en-US"/>
           </a:p>
@@ -5504,7 +5547,7 @@
           <a:p>
             <a:fld id="{7E624077-BD55-4036-8E92-6558FDF3B653}" type="datetime1">
               <a:rPr lang="en-US" smtClean="0"/>
-              <a:t>3/20/2022</a:t>
+              <a:t>3/22/2022</a:t>
             </a:fld>
             <a:endParaRPr lang="en-US"/>
           </a:p>
@@ -5561,7 +5604,7 @@
           <a:p>
             <a:fld id="{F8E28480-1C08-4458-AD97-0283E6FFD09D}" type="slidenum">
               <a:rPr lang="en-US" smtClean="0"/>
-              <a:t>‹Nr.›</a:t>
+              <a:t>‹#›</a:t>
             </a:fld>
             <a:endParaRPr lang="en-US"/>
           </a:p>
@@ -5622,7 +5665,6 @@
               <a:rPr lang="en-US"/>
               <a:t>Click to edit Master title style</a:t>
             </a:r>
-            <a:endParaRPr lang="en-US" dirty="0"/>
           </a:p>
         </p:txBody>
       </p:sp>
@@ -5680,7 +5722,6 @@
               <a:rPr lang="en-US"/>
               <a:t>Fifth level</a:t>
             </a:r>
-            <a:endParaRPr lang="en-US" dirty="0"/>
           </a:p>
         </p:txBody>
       </p:sp>
@@ -6121,9 +6162,9 @@
           <a:p>
             <a:fld id="{5A87773D-8987-489A-A650-3D6F7D5C7C38}" type="datetime1">
               <a:rPr lang="en-US" smtClean="0"/>
-              <a:t>3/20/2022</a:t>
+              <a:t>3/22/2022</a:t>
             </a:fld>
-            <a:endParaRPr lang="en-US" dirty="0"/>
+            <a:endParaRPr lang="en-US"/>
           </a:p>
         </p:txBody>
       </p:sp>
@@ -6149,7 +6190,7 @@
           <a:lstStyle/>
           <a:p>
             <a:r>
-              <a:rPr lang="en-US" dirty="0"/>
+              <a:rPr lang="en-US"/>
               <a:t>Sample Footer Text</a:t>
             </a:r>
           </a:p>
@@ -6178,9 +6219,9 @@
           <a:p>
             <a:fld id="{F3450C42-9A0B-4425-92C2-70FCF7C45734}" type="slidenum">
               <a:rPr lang="en-US" smtClean="0"/>
-              <a:t>‹Nr.›</a:t>
+              <a:t>‹#›</a:t>
             </a:fld>
-            <a:endParaRPr lang="en-US" dirty="0"/>
+            <a:endParaRPr lang="en-US"/>
           </a:p>
         </p:txBody>
       </p:sp>
@@ -6477,7 +6518,7 @@
           <a:p>
             <a:fld id="{804225F2-7107-4609-BCC2-77C63064A5E8}" type="datetime1">
               <a:rPr lang="en-US" smtClean="0"/>
-              <a:t>3/20/2022</a:t>
+              <a:t>3/22/2022</a:t>
             </a:fld>
             <a:endParaRPr lang="en-US"/>
           </a:p>
@@ -6534,7 +6575,7 @@
           <a:p>
             <a:fld id="{F8E28480-1C08-4458-AD97-0283E6FFD09D}" type="slidenum">
               <a:rPr lang="en-US" smtClean="0"/>
-              <a:t>‹Nr.›</a:t>
+              <a:t>‹#›</a:t>
             </a:fld>
             <a:endParaRPr lang="en-US"/>
           </a:p>
@@ -6595,7 +6636,6 @@
               <a:rPr lang="en-US"/>
               <a:t>Click to edit Master title style</a:t>
             </a:r>
-            <a:endParaRPr lang="en-US" dirty="0"/>
           </a:p>
         </p:txBody>
       </p:sp>
@@ -6653,7 +6693,6 @@
               <a:rPr lang="en-US"/>
               <a:t>Fifth level</a:t>
             </a:r>
-            <a:endParaRPr lang="en-US" dirty="0"/>
           </a:p>
         </p:txBody>
       </p:sp>
@@ -6680,7 +6719,7 @@
           <a:p>
             <a:fld id="{11789749-A4CD-447F-8298-2B7988C91CEA}" type="datetime1">
               <a:rPr lang="en-US" smtClean="0"/>
-              <a:t>3/20/2022</a:t>
+              <a:t>3/22/2022</a:t>
             </a:fld>
             <a:endParaRPr lang="en-US"/>
           </a:p>
@@ -6708,7 +6747,7 @@
           <a:lstStyle/>
           <a:p>
             <a:r>
-              <a:rPr lang="en-US" dirty="0"/>
+              <a:rPr lang="en-US"/>
               <a:t>Sample Footer Text</a:t>
             </a:r>
           </a:p>
@@ -6737,7 +6776,7 @@
           <a:p>
             <a:fld id="{F8E28480-1C08-4458-AD97-0283E6FFD09D}" type="slidenum">
               <a:rPr lang="en-US" smtClean="0"/>
-              <a:t>‹Nr.›</a:t>
+              <a:t>‹#›</a:t>
             </a:fld>
             <a:endParaRPr lang="en-US"/>
           </a:p>
@@ -6891,7 +6930,7 @@
           <a:p>
             <a:fld id="{BA0444D3-C0BA-4587-A56C-581AB9F841BE}" type="datetime1">
               <a:rPr lang="en-US" smtClean="0"/>
-              <a:t>3/20/2022</a:t>
+              <a:t>3/22/2022</a:t>
             </a:fld>
             <a:endParaRPr lang="en-US"/>
           </a:p>
@@ -6948,7 +6987,7 @@
           <a:p>
             <a:fld id="{F8E28480-1C08-4458-AD97-0283E6FFD09D}" type="slidenum">
               <a:rPr lang="en-US" smtClean="0"/>
-              <a:t>‹Nr.›</a:t>
+              <a:t>‹#›</a:t>
             </a:fld>
             <a:endParaRPr lang="en-US"/>
           </a:p>
@@ -7018,7 +7057,6 @@
               <a:rPr lang="en-US"/>
               <a:t>Click to edit Master title style</a:t>
             </a:r>
-            <a:endParaRPr lang="en-US" dirty="0"/>
           </a:p>
         </p:txBody>
       </p:sp>
@@ -7584,9 +7622,9 @@
           <a:p>
             <a:fld id="{97E150C1-1D78-4D80-810D-E9E86F6E88AB}" type="datetime1">
               <a:rPr lang="en-US" smtClean="0"/>
-              <a:t>3/20/2022</a:t>
+              <a:t>3/22/2022</a:t>
             </a:fld>
-            <a:endParaRPr lang="en-US" dirty="0"/>
+            <a:endParaRPr lang="en-US"/>
           </a:p>
         </p:txBody>
       </p:sp>
@@ -7612,7 +7650,7 @@
           <a:lstStyle/>
           <a:p>
             <a:r>
-              <a:rPr lang="en-US" dirty="0"/>
+              <a:rPr lang="en-US"/>
               <a:t>Sample Footer Text</a:t>
             </a:r>
           </a:p>
@@ -7641,9 +7679,9 @@
           <a:p>
             <a:fld id="{F3450C42-9A0B-4425-92C2-70FCF7C45734}" type="slidenum">
               <a:rPr lang="en-US" smtClean="0"/>
-              <a:t>‹Nr.›</a:t>
+              <a:t>‹#›</a:t>
             </a:fld>
-            <a:endParaRPr lang="en-US" dirty="0"/>
+            <a:endParaRPr lang="en-US"/>
           </a:p>
         </p:txBody>
       </p:sp>
@@ -7764,7 +7802,6 @@
               <a:rPr lang="en-US"/>
               <a:t>Click to edit Master title style</a:t>
             </a:r>
-            <a:endParaRPr lang="en-US" dirty="0"/>
           </a:p>
         </p:txBody>
       </p:sp>
@@ -7827,7 +7864,6 @@
               <a:rPr lang="en-US"/>
               <a:t>Fifth level</a:t>
             </a:r>
-            <a:endParaRPr lang="en-US" dirty="0"/>
           </a:p>
         </p:txBody>
       </p:sp>
@@ -7890,7 +7926,6 @@
               <a:rPr lang="en-US"/>
               <a:t>Fifth level</a:t>
             </a:r>
-            <a:endParaRPr lang="en-US" dirty="0"/>
           </a:p>
         </p:txBody>
       </p:sp>
@@ -8331,9 +8366,9 @@
           <a:p>
             <a:fld id="{29E9CBD8-1588-4B6B-B74D-87480DDE94C0}" type="datetime1">
               <a:rPr lang="en-US" smtClean="0"/>
-              <a:t>3/20/2022</a:t>
+              <a:t>3/22/2022</a:t>
             </a:fld>
-            <a:endParaRPr lang="en-US" dirty="0"/>
+            <a:endParaRPr lang="en-US"/>
           </a:p>
         </p:txBody>
       </p:sp>
@@ -8359,7 +8394,7 @@
           <a:lstStyle/>
           <a:p>
             <a:r>
-              <a:rPr lang="en-US" dirty="0"/>
+              <a:rPr lang="en-US"/>
               <a:t>Sample Footer Text</a:t>
             </a:r>
           </a:p>
@@ -8388,9 +8423,9 @@
           <a:p>
             <a:fld id="{F3450C42-9A0B-4425-92C2-70FCF7C45734}" type="slidenum">
               <a:rPr lang="en-US" smtClean="0"/>
-              <a:t>‹Nr.›</a:t>
+              <a:t>‹#›</a:t>
             </a:fld>
-            <a:endParaRPr lang="en-US" dirty="0"/>
+            <a:endParaRPr lang="en-US"/>
           </a:p>
         </p:txBody>
       </p:sp>
@@ -8516,7 +8551,6 @@
               <a:rPr lang="en-US"/>
               <a:t>Click to edit Master title style</a:t>
             </a:r>
-            <a:endParaRPr lang="en-US" dirty="0"/>
           </a:p>
         </p:txBody>
       </p:sp>
@@ -8650,7 +8684,6 @@
               <a:rPr lang="en-US"/>
               <a:t>Fifth level</a:t>
             </a:r>
-            <a:endParaRPr lang="en-US" dirty="0"/>
           </a:p>
         </p:txBody>
       </p:sp>
@@ -8784,7 +8817,6 @@
               <a:rPr lang="en-US"/>
               <a:t>Fifth level</a:t>
             </a:r>
-            <a:endParaRPr lang="en-US" dirty="0"/>
           </a:p>
         </p:txBody>
       </p:sp>
@@ -9225,9 +9257,9 @@
           <a:p>
             <a:fld id="{AD794440-721C-4D75-BD4F-4CFB3D51CDCA}" type="datetime1">
               <a:rPr lang="en-US" smtClean="0"/>
-              <a:t>3/20/2022</a:t>
+              <a:t>3/22/2022</a:t>
             </a:fld>
-            <a:endParaRPr lang="en-US" dirty="0"/>
+            <a:endParaRPr lang="en-US"/>
           </a:p>
         </p:txBody>
       </p:sp>
@@ -9253,7 +9285,7 @@
           <a:lstStyle/>
           <a:p>
             <a:r>
-              <a:rPr lang="en-US" dirty="0"/>
+              <a:rPr lang="en-US"/>
               <a:t>Sample Footer Text</a:t>
             </a:r>
           </a:p>
@@ -9282,9 +9314,9 @@
           <a:p>
             <a:fld id="{F3450C42-9A0B-4425-92C2-70FCF7C45734}" type="slidenum">
               <a:rPr lang="en-US" smtClean="0"/>
-              <a:t>‹Nr.›</a:t>
+              <a:t>‹#›</a:t>
             </a:fld>
-            <a:endParaRPr lang="en-US" dirty="0"/>
+            <a:endParaRPr lang="en-US"/>
           </a:p>
         </p:txBody>
       </p:sp>
@@ -9405,7 +9437,6 @@
               <a:rPr lang="en-US"/>
               <a:t>Click to edit Master title style</a:t>
             </a:r>
-            <a:endParaRPr lang="en-US" dirty="0"/>
           </a:p>
         </p:txBody>
       </p:sp>
@@ -9846,9 +9877,9 @@
           <a:p>
             <a:fld id="{B2701A64-483B-4532-94FB-D8F90CB6DEE0}" type="datetime1">
               <a:rPr lang="en-US" smtClean="0"/>
-              <a:t>3/20/2022</a:t>
+              <a:t>3/22/2022</a:t>
             </a:fld>
-            <a:endParaRPr lang="en-US" dirty="0"/>
+            <a:endParaRPr lang="en-US"/>
           </a:p>
         </p:txBody>
       </p:sp>
@@ -9874,7 +9905,7 @@
           <a:lstStyle/>
           <a:p>
             <a:r>
-              <a:rPr lang="en-US" dirty="0"/>
+              <a:rPr lang="en-US"/>
               <a:t>Sample Footer Text</a:t>
             </a:r>
           </a:p>
@@ -9903,9 +9934,9 @@
           <a:p>
             <a:fld id="{F3450C42-9A0B-4425-92C2-70FCF7C45734}" type="slidenum">
               <a:rPr lang="en-US" smtClean="0"/>
-              <a:t>‹Nr.›</a:t>
+              <a:t>‹#›</a:t>
             </a:fld>
-            <a:endParaRPr lang="en-US" dirty="0"/>
+            <a:endParaRPr lang="en-US"/>
           </a:p>
         </p:txBody>
       </p:sp>
@@ -10438,9 +10469,9 @@
           <a:p>
             <a:fld id="{6F18FB39-20FB-4E2E-B861-45B709B9C3C5}" type="datetime1">
               <a:rPr lang="en-US" smtClean="0"/>
-              <a:t>3/20/2022</a:t>
+              <a:t>3/22/2022</a:t>
             </a:fld>
-            <a:endParaRPr lang="en-US" dirty="0"/>
+            <a:endParaRPr lang="en-US"/>
           </a:p>
         </p:txBody>
       </p:sp>
@@ -10466,7 +10497,7 @@
           <a:lstStyle/>
           <a:p>
             <a:r>
-              <a:rPr lang="en-US" dirty="0"/>
+              <a:rPr lang="en-US"/>
               <a:t>Sample Footer Text</a:t>
             </a:r>
           </a:p>
@@ -10495,9 +10526,9 @@
           <a:p>
             <a:fld id="{F3450C42-9A0B-4425-92C2-70FCF7C45734}" type="slidenum">
               <a:rPr lang="en-US" smtClean="0"/>
-              <a:t>‹Nr.›</a:t>
+              <a:t>‹#›</a:t>
             </a:fld>
-            <a:endParaRPr lang="en-US" dirty="0"/>
+            <a:endParaRPr lang="en-US"/>
           </a:p>
         </p:txBody>
       </p:sp>
@@ -10627,7 +10658,6 @@
               <a:rPr lang="en-US"/>
               <a:t>Click to edit Master title style</a:t>
             </a:r>
-            <a:endParaRPr lang="en-US" dirty="0"/>
           </a:p>
         </p:txBody>
       </p:sp>
@@ -10718,7 +10748,6 @@
               <a:rPr lang="en-US"/>
               <a:t>Fifth level</a:t>
             </a:r>
-            <a:endParaRPr lang="en-US" dirty="0"/>
           </a:p>
         </p:txBody>
       </p:sp>
@@ -11230,7 +11259,7 @@
           <a:p>
             <a:fld id="{AC48AC19-8BD6-476C-9770-8884373BCF00}" type="datetime1">
               <a:rPr lang="en-US" smtClean="0"/>
-              <a:t>3/20/2022</a:t>
+              <a:t>3/22/2022</a:t>
             </a:fld>
             <a:endParaRPr lang="en-US"/>
           </a:p>
@@ -11258,7 +11287,7 @@
           <a:lstStyle/>
           <a:p>
             <a:r>
-              <a:rPr lang="en-US" dirty="0"/>
+              <a:rPr lang="en-US"/>
               <a:t>Sample Footer Text</a:t>
             </a:r>
           </a:p>
@@ -11287,9 +11316,9 @@
           <a:p>
             <a:fld id="{F3450C42-9A0B-4425-92C2-70FCF7C45734}" type="slidenum">
               <a:rPr lang="en-US" smtClean="0"/>
-              <a:t>‹Nr.›</a:t>
+              <a:t>‹#›</a:t>
             </a:fld>
-            <a:endParaRPr lang="en-US" dirty="0"/>
+            <a:endParaRPr lang="en-US"/>
           </a:p>
         </p:txBody>
       </p:sp>
@@ -11419,7 +11448,6 @@
               <a:rPr lang="en-US"/>
               <a:t>Click to edit Master title style</a:t>
             </a:r>
-            <a:endParaRPr lang="en-US" dirty="0"/>
           </a:p>
         </p:txBody>
       </p:sp>
@@ -11490,7 +11518,6 @@
               <a:rPr lang="en-US"/>
               <a:t>Click icon to add picture</a:t>
             </a:r>
-            <a:endParaRPr lang="en-US" dirty="0"/>
           </a:p>
         </p:txBody>
       </p:sp>
@@ -12002,9 +12029,9 @@
           <a:p>
             <a:fld id="{F3F68C53-8AD1-4F09-9486-FB3406B99CFA}" type="datetime1">
               <a:rPr lang="en-US" smtClean="0"/>
-              <a:t>3/20/2022</a:t>
+              <a:t>3/22/2022</a:t>
             </a:fld>
-            <a:endParaRPr lang="en-US" dirty="0"/>
+            <a:endParaRPr lang="en-US"/>
           </a:p>
         </p:txBody>
       </p:sp>
@@ -12030,7 +12057,7 @@
           <a:lstStyle/>
           <a:p>
             <a:r>
-              <a:rPr lang="en-US" dirty="0"/>
+              <a:rPr lang="en-US"/>
               <a:t>Sample Footer Text</a:t>
             </a:r>
           </a:p>
@@ -12059,9 +12086,9 @@
           <a:p>
             <a:fld id="{F3450C42-9A0B-4425-92C2-70FCF7C45734}" type="slidenum">
               <a:rPr lang="en-US" smtClean="0"/>
-              <a:t>‹Nr.›</a:t>
+              <a:t>‹#›</a:t>
             </a:fld>
-            <a:endParaRPr lang="en-US" dirty="0"/>
+            <a:endParaRPr lang="en-US"/>
           </a:p>
         </p:txBody>
       </p:sp>
@@ -12197,7 +12224,6 @@
               <a:rPr lang="en-US"/>
               <a:t>Click to edit Master title style</a:t>
             </a:r>
-            <a:endParaRPr lang="en-US" dirty="0"/>
           </a:p>
         </p:txBody>
       </p:sp>
@@ -12265,7 +12291,6 @@
               <a:rPr lang="en-US"/>
               <a:t>Fifth level</a:t>
             </a:r>
-            <a:endParaRPr lang="en-US" dirty="0"/>
           </a:p>
         </p:txBody>
       </p:sp>
@@ -12313,9 +12338,9 @@
             <a:fld id="{BA543EDD-D0D2-447F-B24F-3717AF4B109D}" type="datetime1">
               <a:rPr lang="en-US" smtClean="0"/>
               <a:pPr/>
-              <a:t>3/20/2022</a:t>
+              <a:t>3/22/2022</a:t>
             </a:fld>
-            <a:endParaRPr lang="en-US" dirty="0"/>
+            <a:endParaRPr lang="en-US"/>
           </a:p>
         </p:txBody>
       </p:sp>
@@ -12361,7 +12386,7 @@
           </a:lstStyle>
           <a:p>
             <a:r>
-              <a:rPr lang="en-US" dirty="0"/>
+              <a:rPr lang="en-US"/>
               <a:t>Sample Footer Text</a:t>
             </a:r>
           </a:p>
@@ -12411,9 +12436,9 @@
             <a:fld id="{F3450C42-9A0B-4425-92C2-70FCF7C45734}" type="slidenum">
               <a:rPr lang="en-US" smtClean="0"/>
               <a:pPr/>
-              <a:t>‹Nr.›</a:t>
+              <a:t>‹#›</a:t>
             </a:fld>
-            <a:endParaRPr lang="en-US" dirty="0"/>
+            <a:endParaRPr lang="en-US"/>
           </a:p>
         </p:txBody>
       </p:sp>
@@ -12779,7 +12804,6 @@
               <a:rPr lang="en-US"/>
               <a:t>Click to edit Master title style</a:t>
             </a:r>
-            <a:endParaRPr lang="en-US" dirty="0"/>
           </a:p>
         </p:txBody>
       </p:sp>
@@ -12847,7 +12871,6 @@
               <a:rPr lang="en-US"/>
               <a:t>Fifth level</a:t>
             </a:r>
-            <a:endParaRPr lang="en-US" dirty="0"/>
           </a:p>
         </p:txBody>
       </p:sp>
@@ -12894,7 +12917,7 @@
           <a:p>
             <a:fld id="{D3FE42E8-8B57-452D-A122-4DCE9AC771EF}" type="datetime1">
               <a:rPr lang="en-US" smtClean="0"/>
-              <a:t>3/20/2022</a:t>
+              <a:t>3/22/2022</a:t>
             </a:fld>
             <a:endParaRPr lang="en-US"/>
           </a:p>
@@ -12942,7 +12965,7 @@
           </a:lstStyle>
           <a:p>
             <a:r>
-              <a:rPr lang="en-US" dirty="0"/>
+              <a:rPr lang="en-US"/>
               <a:t>Sample Footer Text</a:t>
             </a:r>
           </a:p>
@@ -12992,7 +13015,7 @@
             <a:fld id="{F8E28480-1C08-4458-AD97-0283E6FFD09D}" type="slidenum">
               <a:rPr lang="en-US" smtClean="0"/>
               <a:pPr/>
-              <a:t>‹Nr.›</a:t>
+              <a:t>‹#›</a:t>
             </a:fld>
             <a:endParaRPr lang="en-US"/>
           </a:p>
@@ -13558,13 +13581,13 @@
           <a:lstStyle/>
           <a:p>
             <a:r>
-              <a:rPr lang="de-DE" sz="5400" dirty="0" err="1">
+              <a:rPr lang="de-DE" sz="5400" err="1">
                 <a:cs typeface="Calibri Light"/>
               </a:rPr>
               <a:t>Sketchy</a:t>
             </a:r>
             <a:r>
-              <a:rPr lang="de-DE" sz="5400" dirty="0">
+              <a:rPr lang="de-DE" sz="5400">
                 <a:cs typeface="Calibri Light"/>
               </a:rPr>
               <a:t> Mine</a:t>
@@ -13596,7 +13619,7 @@
           <a:lstStyle/>
           <a:p>
             <a:r>
-              <a:rPr lang="de-DE" sz="3200" dirty="0">
+              <a:rPr lang="de-DE" sz="3200">
                 <a:cs typeface="Calibri"/>
               </a:rPr>
               <a:t>Sprint 2 Review</a:t>
@@ -13692,15 +13715,15 @@
           <a:lstStyle/>
           <a:p>
             <a:r>
-              <a:rPr lang="de-DE" dirty="0" err="1"/>
+              <a:rPr lang="de-DE" err="1"/>
               <a:t>Recap</a:t>
             </a:r>
             <a:r>
-              <a:rPr lang="de-DE" dirty="0"/>
+              <a:rPr lang="de-DE"/>
               <a:t> game </a:t>
             </a:r>
             <a:r>
-              <a:rPr lang="de-DE" dirty="0" err="1"/>
+              <a:rPr lang="de-DE" err="1"/>
               <a:t>idea</a:t>
             </a:r>
           </a:p>
@@ -13978,19 +14001,19 @@
           <a:lstStyle/>
           <a:p>
             <a:r>
-              <a:rPr lang="de-DE" dirty="0"/>
+              <a:rPr lang="de-DE"/>
               <a:t>Web </a:t>
             </a:r>
             <a:r>
-              <a:rPr lang="de-DE" dirty="0" err="1"/>
+              <a:rPr lang="de-DE" err="1"/>
               <a:t>browser</a:t>
             </a:r>
             <a:r>
-              <a:rPr lang="de-DE" dirty="0"/>
+              <a:rPr lang="de-DE"/>
               <a:t> </a:t>
             </a:r>
             <a:r>
-              <a:rPr lang="de-DE" dirty="0" err="1"/>
+              <a:rPr lang="de-DE" err="1"/>
               <a:t>based</a:t>
             </a:r>
           </a:p>
@@ -14028,11 +14051,11 @@
           <a:lstStyle/>
           <a:p>
             <a:r>
-              <a:rPr lang="de-DE" dirty="0"/>
+              <a:rPr lang="de-DE"/>
               <a:t>Multiplayer / </a:t>
             </a:r>
             <a:r>
-              <a:rPr lang="de-DE" dirty="0" err="1"/>
+              <a:rPr lang="de-DE" err="1"/>
               <a:t>Multirole</a:t>
             </a:r>
           </a:p>
@@ -14070,14 +14093,14 @@
           <a:lstStyle/>
           <a:p>
             <a:r>
-              <a:rPr lang="de-DE" dirty="0"/>
+              <a:rPr lang="de-DE"/>
               <a:t>Team </a:t>
             </a:r>
             <a:r>
-              <a:rPr lang="de-DE" dirty="0" err="1"/>
+              <a:rPr lang="de-DE" err="1"/>
               <a:t>based</a:t>
             </a:r>
-            <a:endParaRPr lang="de-DE" dirty="0"/>
+            <a:endParaRPr lang="de-DE"/>
           </a:p>
         </p:txBody>
       </p:sp>
@@ -14113,7 +14136,7 @@
           <a:lstStyle/>
           <a:p>
             <a:r>
-              <a:rPr lang="de-DE" dirty="0"/>
+              <a:rPr lang="de-DE"/>
               <a:t>Ranking</a:t>
             </a:r>
           </a:p>
@@ -14151,7 +14174,7 @@
           <a:lstStyle/>
           <a:p>
             <a:r>
-              <a:rPr lang="de-DE" dirty="0"/>
+              <a:rPr lang="de-DE"/>
               <a:t>Online</a:t>
             </a:r>
           </a:p>
@@ -14189,7 +14212,7 @@
           <a:lstStyle/>
           <a:p>
             <a:r>
-              <a:rPr lang="de-DE" dirty="0" err="1"/>
+              <a:rPr lang="de-DE" err="1"/>
               <a:t>Chatting</a:t>
             </a:r>
           </a:p>
@@ -14227,7 +14250,7 @@
           <a:lstStyle/>
           <a:p>
             <a:r>
-              <a:rPr lang="de-DE" dirty="0"/>
+              <a:rPr lang="de-DE"/>
               <a:t>Moderation</a:t>
             </a:r>
           </a:p>
@@ -14265,19 +14288,19 @@
           <a:lstStyle/>
           <a:p>
             <a:r>
-              <a:rPr lang="de-DE" dirty="0"/>
+              <a:rPr lang="de-DE"/>
               <a:t>Emerald </a:t>
             </a:r>
             <a:r>
-              <a:rPr lang="de-DE" dirty="0" err="1"/>
+              <a:rPr lang="de-DE" err="1"/>
               <a:t>mine</a:t>
             </a:r>
             <a:r>
-              <a:rPr lang="de-DE" dirty="0"/>
+              <a:rPr lang="de-DE"/>
               <a:t> </a:t>
             </a:r>
             <a:r>
-              <a:rPr lang="de-DE" dirty="0" err="1"/>
+              <a:rPr lang="de-DE" err="1"/>
               <a:t>inspired</a:t>
             </a:r>
           </a:p>
@@ -14391,15 +14414,15 @@
           </a:lstStyle>
           <a:p>
             <a:r>
-              <a:rPr lang="de-DE" dirty="0" err="1"/>
+              <a:rPr lang="de-DE" err="1"/>
               <a:t>Recap</a:t>
             </a:r>
             <a:r>
-              <a:rPr lang="de-DE" dirty="0"/>
+              <a:rPr lang="de-DE"/>
               <a:t> game </a:t>
             </a:r>
             <a:r>
-              <a:rPr lang="de-DE" dirty="0" err="1"/>
+              <a:rPr lang="de-DE" err="1"/>
               <a:t>idea</a:t>
             </a:r>
           </a:p>
@@ -14419,6 +14442,104 @@
 </file>
 
 <file path=ppt/slides/slide4.xml><?xml version="1.0" encoding="utf-8"?>
+<p:sld xmlns:a="http://schemas.openxmlformats.org/drawingml/2006/main" xmlns:r="http://schemas.openxmlformats.org/officeDocument/2006/relationships" xmlns:p="http://schemas.openxmlformats.org/presentationml/2006/main">
+  <p:cSld>
+    <p:spTree>
+      <p:nvGrpSpPr>
+        <p:cNvPr id="1" name=""/>
+        <p:cNvGrpSpPr/>
+        <p:nvPr/>
+      </p:nvGrpSpPr>
+      <p:grpSpPr>
+        <a:xfrm>
+          <a:off x="0" y="0"/>
+          <a:ext cx="0" cy="0"/>
+          <a:chOff x="0" y="0"/>
+          <a:chExt cx="0" cy="0"/>
+        </a:xfrm>
+      </p:grpSpPr>
+      <p:sp>
+        <p:nvSpPr>
+          <p:cNvPr id="2" name="Title 1">
+            <a:extLst>
+              <a:ext uri="{FF2B5EF4-FFF2-40B4-BE49-F238E27FC236}">
+                <a16:creationId xmlns:a16="http://schemas.microsoft.com/office/drawing/2014/main" id="{7F96819A-D5A9-B1D6-571B-9C2DD1C8B6A3}"/>
+              </a:ext>
+            </a:extLst>
+          </p:cNvPr>
+          <p:cNvSpPr>
+            <a:spLocks noGrp="1"/>
+          </p:cNvSpPr>
+          <p:nvPr>
+            <p:ph type="title"/>
+          </p:nvPr>
+        </p:nvSpPr>
+        <p:spPr/>
+        <p:txBody>
+          <a:bodyPr>
+            <a:normAutofit/>
+          </a:bodyPr>
+          <a:lstStyle/>
+          <a:p>
+            <a:r>
+              <a:rPr lang="en-US" sz="4800"/>
+              <a:t>Estimated price for the sprint – $13, 200</a:t>
+            </a:r>
+          </a:p>
+        </p:txBody>
+      </p:sp>
+      <p:sp>
+        <p:nvSpPr>
+          <p:cNvPr id="3" name="Text Placeholder 2">
+            <a:extLst>
+              <a:ext uri="{FF2B5EF4-FFF2-40B4-BE49-F238E27FC236}">
+                <a16:creationId xmlns:a16="http://schemas.microsoft.com/office/drawing/2014/main" id="{867C4F89-223D-849E-89AD-8BB4C18B61A3}"/>
+              </a:ext>
+            </a:extLst>
+          </p:cNvPr>
+          <p:cNvSpPr>
+            <a:spLocks noGrp="1"/>
+          </p:cNvSpPr>
+          <p:nvPr>
+            <p:ph type="body" idx="1"/>
+          </p:nvPr>
+        </p:nvSpPr>
+        <p:spPr/>
+        <p:txBody>
+          <a:bodyPr vert="horz" lIns="91440" tIns="45720" rIns="91440" bIns="45720" rtlCol="0" anchor="t">
+            <a:normAutofit/>
+          </a:bodyPr>
+          <a:lstStyle/>
+          <a:p>
+            <a:r>
+              <a:rPr lang="en-US" sz="4800"/>
+              <a:t>Actual cost for the sprint - $</a:t>
+            </a:r>
+            <a:r>
+              <a:rPr lang="en-US" sz="4800">
+                <a:ea typeface="+mj-lt"/>
+                <a:cs typeface="+mj-lt"/>
+              </a:rPr>
+              <a:t>9'553</a:t>
+            </a:r>
+            <a:endParaRPr lang="en-US" sz="4800"/>
+          </a:p>
+        </p:txBody>
+      </p:sp>
+    </p:spTree>
+    <p:extLst>
+      <p:ext uri="{BB962C8B-B14F-4D97-AF65-F5344CB8AC3E}">
+        <p14:creationId xmlns:p14="http://schemas.microsoft.com/office/powerpoint/2010/main" val="2947484381"/>
+      </p:ext>
+    </p:extLst>
+  </p:cSld>
+  <p:clrMapOvr>
+    <a:masterClrMapping/>
+  </p:clrMapOvr>
+</p:sld>
+</file>
+
+<file path=ppt/slides/slide5.xml><?xml version="1.0" encoding="utf-8"?>
 <p:sld xmlns:a="http://schemas.openxmlformats.org/drawingml/2006/main" xmlns:r="http://schemas.openxmlformats.org/officeDocument/2006/relationships" xmlns:p="http://schemas.openxmlformats.org/presentationml/2006/main">
   <p:cSld>
     <p:bg>
@@ -14614,7 +14735,7 @@
           <a:lstStyle/>
           <a:p>
             <a:r>
-              <a:rPr lang="en-US" sz="3200" kern="1200" cap="all" spc="300" baseline="0" dirty="0">
+              <a:rPr lang="en-US" sz="3200" kern="1200" cap="all" spc="300" baseline="0">
                 <a:solidFill>
                   <a:schemeClr val="bg2"/>
                 </a:solidFill>
@@ -14624,7 +14745,7 @@
               </a:rPr>
               <a:t>Progress</a:t>
             </a:r>
-            <a:endParaRPr lang="en-US" sz="3200" kern="1200" cap="all" spc="300" baseline="0" dirty="0">
+            <a:endParaRPr lang="en-US" sz="3200" kern="1200" cap="all" spc="300" baseline="0">
               <a:solidFill>
                 <a:schemeClr val="bg2"/>
               </a:solidFill>
@@ -14772,7 +14893,7 @@
 </p:sld>
 </file>
 
-<file path=ppt/slides/slide5.xml><?xml version="1.0" encoding="utf-8"?>
+<file path=ppt/slides/slide6.xml><?xml version="1.0" encoding="utf-8"?>
 <p:sld xmlns:a="http://schemas.openxmlformats.org/drawingml/2006/main" xmlns:r="http://schemas.openxmlformats.org/officeDocument/2006/relationships" xmlns:p="http://schemas.openxmlformats.org/presentationml/2006/main">
   <p:cSld>
     <p:bg>
@@ -14996,7 +15117,7 @@
           <a:lstStyle/>
           <a:p>
             <a:r>
-              <a:rPr lang="en-US" sz="6600" kern="1200" cap="all" spc="300" baseline="0" dirty="0">
+              <a:rPr lang="en-US" sz="6600" kern="1200" cap="all" spc="300" baseline="0">
                 <a:solidFill>
                   <a:schemeClr val="tx1"/>
                 </a:solidFill>
@@ -15006,7 +15127,7 @@
               </a:rPr>
               <a:t>DEMO</a:t>
             </a:r>
-            <a:endParaRPr lang="en-US" sz="6600" kern="1200" cap="all" spc="300" baseline="0" dirty="0">
+            <a:endParaRPr lang="en-US" sz="6600" kern="1200" cap="all" spc="300" baseline="0">
               <a:solidFill>
                 <a:schemeClr val="tx1"/>
               </a:solidFill>
@@ -15043,7 +15164,7 @@
           </a:bodyPr>
           <a:lstStyle/>
           <a:p>
-            <a:endParaRPr lang="en-US" sz="2400" i="1" kern="1200" dirty="0">
+            <a:endParaRPr lang="en-US" sz="2400" i="1" kern="1200">
               <a:solidFill>
                 <a:schemeClr val="tx2"/>
               </a:solidFill>
@@ -15067,7 +15188,7 @@
 </p:sld>
 </file>
 
-<file path=ppt/slides/slide6.xml><?xml version="1.0" encoding="utf-8"?>
+<file path=ppt/slides/slide7.xml><?xml version="1.0" encoding="utf-8"?>
 <p:sld xmlns:a="http://schemas.openxmlformats.org/drawingml/2006/main" xmlns:r="http://schemas.openxmlformats.org/officeDocument/2006/relationships" xmlns:p="http://schemas.openxmlformats.org/presentationml/2006/main">
   <p:cSld>
     <p:bg>
@@ -15306,7 +15427,7 @@
           <a:lstStyle/>
           <a:p>
             <a:r>
-              <a:rPr lang="en-US" sz="6000" kern="1200" cap="all" spc="300" baseline="0" dirty="0">
+              <a:rPr lang="en-US" sz="6000" kern="1200" cap="all" spc="300" baseline="0">
                 <a:solidFill>
                   <a:schemeClr val="tx1"/>
                 </a:solidFill>
@@ -15348,14 +15469,14 @@
           <a:lstStyle/>
           <a:p>
             <a:r>
-              <a:rPr lang="en-US" sz="3200" dirty="0">
+              <a:rPr lang="en-US" sz="3200">
                 <a:solidFill>
                   <a:schemeClr val="tx1"/>
                 </a:solidFill>
               </a:rPr>
               <a:t>What should we do?</a:t>
             </a:r>
-            <a:endParaRPr lang="en-US" sz="3200" i="1" kern="1200" dirty="0">
+            <a:endParaRPr lang="en-US" sz="3200" i="1" kern="1200">
               <a:solidFill>
                 <a:schemeClr val="tx1"/>
               </a:solidFill>
@@ -15379,7 +15500,7 @@
 </p:sld>
 </file>
 
-<file path=ppt/slides/slide7.xml><?xml version="1.0" encoding="utf-8"?>
+<file path=ppt/slides/slide8.xml><?xml version="1.0" encoding="utf-8"?>
 <p:sld xmlns:a="http://schemas.openxmlformats.org/drawingml/2006/main" xmlns:r="http://schemas.openxmlformats.org/officeDocument/2006/relationships" xmlns:p="http://schemas.openxmlformats.org/presentationml/2006/main">
   <p:cSld>
     <p:bg>
@@ -15603,7 +15724,7 @@
           <a:lstStyle/>
           <a:p>
             <a:r>
-              <a:rPr lang="en-US" sz="3600" kern="1200" cap="all" spc="300" baseline="0" dirty="0">
+              <a:rPr lang="en-US" sz="3600" kern="1200" cap="all" spc="300" baseline="0">
                 <a:solidFill>
                   <a:schemeClr val="tx2"/>
                 </a:solidFill>
@@ -15659,54 +15780,54 @@
           <a:p>
             <a:pPr algn="ctr"/>
             <a:r>
-              <a:rPr lang="de-DE" dirty="0"/>
+              <a:rPr lang="de-DE"/>
               <a:t>+ </a:t>
             </a:r>
             <a:r>
-              <a:rPr lang="de-DE" dirty="0" err="1"/>
+              <a:rPr lang="de-DE" err="1"/>
               <a:t>Polished</a:t>
             </a:r>
             <a:r>
-              <a:rPr lang="de-DE" dirty="0"/>
+              <a:rPr lang="de-DE"/>
               <a:t> </a:t>
             </a:r>
             <a:r>
-              <a:rPr lang="de-DE" dirty="0" err="1"/>
+              <a:rPr lang="de-DE" err="1"/>
               <a:t>look</a:t>
             </a:r>
             <a:r>
-              <a:rPr lang="de-DE" dirty="0"/>
+              <a:rPr lang="de-DE"/>
               <a:t> </a:t>
             </a:r>
             <a:r>
-              <a:rPr lang="de-DE" dirty="0" err="1"/>
+              <a:rPr lang="de-DE" err="1"/>
               <a:t>of</a:t>
             </a:r>
             <a:r>
-              <a:rPr lang="de-DE" dirty="0"/>
+              <a:rPr lang="de-DE"/>
               <a:t> </a:t>
             </a:r>
             <a:r>
-              <a:rPr lang="de-DE" dirty="0" err="1"/>
+              <a:rPr lang="de-DE" err="1"/>
               <a:t>the</a:t>
             </a:r>
             <a:r>
-              <a:rPr lang="de-DE" dirty="0"/>
+              <a:rPr lang="de-DE"/>
               <a:t> game</a:t>
             </a:r>
           </a:p>
           <a:p>
             <a:pPr algn="ctr"/>
             <a:r>
-              <a:rPr lang="de-DE" dirty="0"/>
+              <a:rPr lang="de-DE"/>
               <a:t>- Moderator </a:t>
             </a:r>
             <a:r>
-              <a:rPr lang="de-DE" dirty="0" err="1"/>
+              <a:rPr lang="de-DE" err="1"/>
               <a:t>abilities</a:t>
             </a:r>
             <a:r>
-              <a:rPr lang="de-DE" dirty="0"/>
+              <a:rPr lang="de-DE"/>
               <a:t>          </a:t>
             </a:r>
           </a:p>
@@ -15755,51 +15876,51 @@
           <a:p>
             <a:pPr algn="ctr"/>
             <a:r>
-              <a:rPr lang="de-DE" dirty="0"/>
+              <a:rPr lang="de-DE"/>
               <a:t>+ All </a:t>
             </a:r>
             <a:r>
-              <a:rPr lang="de-DE" dirty="0" err="1"/>
+              <a:rPr lang="de-DE" err="1"/>
               <a:t>requirements</a:t>
             </a:r>
             <a:r>
-              <a:rPr lang="de-DE" dirty="0"/>
+              <a:rPr lang="de-DE"/>
               <a:t> </a:t>
             </a:r>
             <a:r>
-              <a:rPr lang="de-DE" dirty="0" err="1"/>
+              <a:rPr lang="de-DE" err="1"/>
               <a:t>completed</a:t>
             </a:r>
-            <a:endParaRPr lang="de-DE" dirty="0"/>
+            <a:endParaRPr lang="de-DE"/>
           </a:p>
           <a:p>
             <a:pPr algn="ctr"/>
             <a:r>
-              <a:rPr lang="de-DE" dirty="0"/>
+              <a:rPr lang="de-DE"/>
               <a:t>- Not </a:t>
             </a:r>
             <a:r>
-              <a:rPr lang="de-DE" dirty="0" err="1"/>
+              <a:rPr lang="de-DE" err="1"/>
               <a:t>as</a:t>
             </a:r>
             <a:r>
-              <a:rPr lang="de-DE" dirty="0"/>
+              <a:rPr lang="de-DE"/>
               <a:t> </a:t>
             </a:r>
             <a:r>
-              <a:rPr lang="de-DE" dirty="0" err="1"/>
+              <a:rPr lang="de-DE" err="1"/>
               <a:t>good</a:t>
             </a:r>
             <a:r>
-              <a:rPr lang="de-DE" dirty="0"/>
+              <a:rPr lang="de-DE"/>
               <a:t> </a:t>
             </a:r>
             <a:r>
-              <a:rPr lang="de-DE" dirty="0" err="1"/>
+              <a:rPr lang="de-DE" err="1"/>
               <a:t>looking</a:t>
             </a:r>
             <a:r>
-              <a:rPr lang="de-DE" dirty="0"/>
+              <a:rPr lang="de-DE"/>
               <a:t> GUI    </a:t>
             </a:r>
           </a:p>
@@ -15818,7 +15939,7 @@
 </p:sld>
 </file>
 
-<file path=ppt/slides/slide8.xml><?xml version="1.0" encoding="utf-8"?>
+<file path=ppt/slides/slide9.xml><?xml version="1.0" encoding="utf-8"?>
 <p:sld xmlns:a="http://schemas.openxmlformats.org/drawingml/2006/main" xmlns:r="http://schemas.openxmlformats.org/officeDocument/2006/relationships" xmlns:p="http://schemas.openxmlformats.org/presentationml/2006/main">
   <p:cSld>
     <p:bg>
@@ -16074,10 +16195,10 @@
           <a:lstStyle/>
           <a:p>
             <a:r>
-              <a:rPr lang="en-US" sz="4000" cap="all" spc="300" dirty="0"/>
+              <a:rPr lang="en-US" sz="4000" cap="all" spc="300"/>
               <a:t>THANK YOU FOR YOUR ATTENTION</a:t>
             </a:r>
-            <a:endParaRPr lang="en-US" sz="4000" kern="1200" cap="all" spc="300" baseline="0" dirty="0">
+            <a:endParaRPr lang="en-US" sz="4000" kern="1200" cap="all" spc="300" baseline="0">
               <a:latin typeface="+mj-lt"/>
             </a:endParaRPr>
           </a:p>

</xml_diff>